<commit_message>
added slide with gh repo
</commit_message>
<xml_diff>
--- a/slides/remote-sensing-intro.pptx
+++ b/slides/remote-sensing-intro.pptx
@@ -12,6 +12,7 @@
     <p:sldId id="263" r:id="rId6"/>
     <p:sldId id="262" r:id="rId7"/>
     <p:sldId id="261" r:id="rId8"/>
+    <p:sldId id="264" r:id="rId9"/>
   </p:sldIdLst>
   <p:sldSz cx="12192000" cy="6858000"/>
   <p:notesSz cx="6858000" cy="9144000"/>
@@ -276,7 +277,7 @@
           <a:p>
             <a:fld id="{28399A50-FCE3-4952-AC0D-E5D3B3A2EB2C}" type="datetimeFigureOut">
               <a:rPr lang="en-US" smtClean="0"/>
-              <a:t>2023-08-05</a:t>
+              <a:t>2023-08-06</a:t>
             </a:fld>
             <a:endParaRPr lang="en-US"/>
           </a:p>
@@ -474,7 +475,7 @@
           <a:p>
             <a:fld id="{28399A50-FCE3-4952-AC0D-E5D3B3A2EB2C}" type="datetimeFigureOut">
               <a:rPr lang="en-US" smtClean="0"/>
-              <a:t>2023-08-05</a:t>
+              <a:t>2023-08-06</a:t>
             </a:fld>
             <a:endParaRPr lang="en-US"/>
           </a:p>
@@ -682,7 +683,7 @@
           <a:p>
             <a:fld id="{28399A50-FCE3-4952-AC0D-E5D3B3A2EB2C}" type="datetimeFigureOut">
               <a:rPr lang="en-US" smtClean="0"/>
-              <a:t>2023-08-05</a:t>
+              <a:t>2023-08-06</a:t>
             </a:fld>
             <a:endParaRPr lang="en-US"/>
           </a:p>
@@ -890,7 +891,7 @@
           <a:p>
             <a:fld id="{28399A50-FCE3-4952-AC0D-E5D3B3A2EB2C}" type="datetimeFigureOut">
               <a:rPr lang="en-US" smtClean="0"/>
-              <a:t>2023-08-05</a:t>
+              <a:t>2023-08-06</a:t>
             </a:fld>
             <a:endParaRPr lang="en-US"/>
           </a:p>
@@ -1165,7 +1166,7 @@
           <a:p>
             <a:fld id="{28399A50-FCE3-4952-AC0D-E5D3B3A2EB2C}" type="datetimeFigureOut">
               <a:rPr lang="en-US" smtClean="0"/>
-              <a:t>2023-08-05</a:t>
+              <a:t>2023-08-06</a:t>
             </a:fld>
             <a:endParaRPr lang="en-US"/>
           </a:p>
@@ -1430,7 +1431,7 @@
           <a:p>
             <a:fld id="{28399A50-FCE3-4952-AC0D-E5D3B3A2EB2C}" type="datetimeFigureOut">
               <a:rPr lang="en-US" smtClean="0"/>
-              <a:t>2023-08-05</a:t>
+              <a:t>2023-08-06</a:t>
             </a:fld>
             <a:endParaRPr lang="en-US"/>
           </a:p>
@@ -1842,7 +1843,7 @@
           <a:p>
             <a:fld id="{28399A50-FCE3-4952-AC0D-E5D3B3A2EB2C}" type="datetimeFigureOut">
               <a:rPr lang="en-US" smtClean="0"/>
-              <a:t>2023-08-05</a:t>
+              <a:t>2023-08-06</a:t>
             </a:fld>
             <a:endParaRPr lang="en-US"/>
           </a:p>
@@ -1983,7 +1984,7 @@
           <a:p>
             <a:fld id="{28399A50-FCE3-4952-AC0D-E5D3B3A2EB2C}" type="datetimeFigureOut">
               <a:rPr lang="en-US" smtClean="0"/>
-              <a:t>2023-08-05</a:t>
+              <a:t>2023-08-06</a:t>
             </a:fld>
             <a:endParaRPr lang="en-US"/>
           </a:p>
@@ -2096,7 +2097,7 @@
           <a:p>
             <a:fld id="{28399A50-FCE3-4952-AC0D-E5D3B3A2EB2C}" type="datetimeFigureOut">
               <a:rPr lang="en-US" smtClean="0"/>
-              <a:t>2023-08-05</a:t>
+              <a:t>2023-08-06</a:t>
             </a:fld>
             <a:endParaRPr lang="en-US"/>
           </a:p>
@@ -2407,7 +2408,7 @@
           <a:p>
             <a:fld id="{28399A50-FCE3-4952-AC0D-E5D3B3A2EB2C}" type="datetimeFigureOut">
               <a:rPr lang="en-US" smtClean="0"/>
-              <a:t>2023-08-05</a:t>
+              <a:t>2023-08-06</a:t>
             </a:fld>
             <a:endParaRPr lang="en-US"/>
           </a:p>
@@ -2695,7 +2696,7 @@
           <a:p>
             <a:fld id="{28399A50-FCE3-4952-AC0D-E5D3B3A2EB2C}" type="datetimeFigureOut">
               <a:rPr lang="en-US" smtClean="0"/>
-              <a:t>2023-08-05</a:t>
+              <a:t>2023-08-06</a:t>
             </a:fld>
             <a:endParaRPr lang="en-US"/>
           </a:p>
@@ -2936,7 +2937,7 @@
           <a:p>
             <a:fld id="{28399A50-FCE3-4952-AC0D-E5D3B3A2EB2C}" type="datetimeFigureOut">
               <a:rPr lang="en-US" smtClean="0"/>
-              <a:t>2023-08-05</a:t>
+              <a:t>2023-08-06</a:t>
             </a:fld>
             <a:endParaRPr lang="en-US"/>
           </a:p>
@@ -5569,6 +5570,315 @@
 </p:sld>
 </file>
 
+<file path=ppt/slides/slide8.xml><?xml version="1.0" encoding="utf-8"?>
+<p:sld xmlns:a="http://schemas.openxmlformats.org/drawingml/2006/main" xmlns:r="http://schemas.openxmlformats.org/officeDocument/2006/relationships" xmlns:p="http://schemas.openxmlformats.org/presentationml/2006/main">
+  <p:cSld>
+    <p:spTree>
+      <p:nvGrpSpPr>
+        <p:cNvPr id="1" name=""/>
+        <p:cNvGrpSpPr/>
+        <p:nvPr/>
+      </p:nvGrpSpPr>
+      <p:grpSpPr>
+        <a:xfrm>
+          <a:off x="0" y="0"/>
+          <a:ext cx="0" cy="0"/>
+          <a:chOff x="0" y="0"/>
+          <a:chExt cx="0" cy="0"/>
+        </a:xfrm>
+      </p:grpSpPr>
+      <p:sp>
+        <p:nvSpPr>
+          <p:cNvPr id="2" name="Title 1">
+            <a:extLst>
+              <a:ext uri="{FF2B5EF4-FFF2-40B4-BE49-F238E27FC236}">
+                <a16:creationId xmlns:a16="http://schemas.microsoft.com/office/drawing/2014/main" id="{0A0347F5-B8EF-4165-B7E3-03079BECE968}"/>
+              </a:ext>
+            </a:extLst>
+          </p:cNvPr>
+          <p:cNvSpPr>
+            <a:spLocks noGrp="1"/>
+          </p:cNvSpPr>
+          <p:nvPr>
+            <p:ph type="title"/>
+          </p:nvPr>
+        </p:nvSpPr>
+        <p:spPr/>
+        <p:txBody>
+          <a:bodyPr>
+            <a:normAutofit fontScale="90000"/>
+          </a:bodyPr>
+          <a:lstStyle/>
+          <a:p>
+            <a:r>
+              <a:rPr lang="en-CA" dirty="0"/>
+              <a:t>Today’s material</a:t>
+            </a:r>
+            <a:endParaRPr lang="en-US" dirty="0"/>
+          </a:p>
+        </p:txBody>
+      </p:sp>
+      <p:sp>
+        <p:nvSpPr>
+          <p:cNvPr id="3" name="Content Placeholder 2">
+            <a:extLst>
+              <a:ext uri="{FF2B5EF4-FFF2-40B4-BE49-F238E27FC236}">
+                <a16:creationId xmlns:a16="http://schemas.microsoft.com/office/drawing/2014/main" id="{2FCA6251-BAA8-4132-AF53-DD3BD8BADCB8}"/>
+              </a:ext>
+            </a:extLst>
+          </p:cNvPr>
+          <p:cNvSpPr>
+            <a:spLocks noGrp="1"/>
+          </p:cNvSpPr>
+          <p:nvPr>
+            <p:ph idx="1"/>
+          </p:nvPr>
+        </p:nvSpPr>
+        <p:spPr/>
+        <p:txBody>
+          <a:bodyPr anchor="t">
+            <a:normAutofit/>
+          </a:bodyPr>
+          <a:lstStyle/>
+          <a:p>
+            <a:pPr marL="0" indent="0" algn="ctr">
+              <a:buNone/>
+            </a:pPr>
+            <a:r>
+              <a:rPr lang="en-US" sz="4000" dirty="0">
+                <a:hlinkClick r:id="rId2"/>
+              </a:rPr>
+              <a:t>tinyurl.com/2023-animove-rs</a:t>
+            </a:r>
+            <a:endParaRPr lang="en-US" sz="4000" dirty="0"/>
+          </a:p>
+        </p:txBody>
+      </p:sp>
+      <p:pic>
+        <p:nvPicPr>
+          <p:cNvPr id="7" name="Picture 6">
+            <a:extLst>
+              <a:ext uri="{FF2B5EF4-FFF2-40B4-BE49-F238E27FC236}">
+                <a16:creationId xmlns:a16="http://schemas.microsoft.com/office/drawing/2014/main" id="{16BBA679-CA33-499B-8BA2-0B86BEEE251E}"/>
+              </a:ext>
+            </a:extLst>
+          </p:cNvPr>
+          <p:cNvPicPr>
+            <a:picLocks noChangeAspect="1"/>
+          </p:cNvPicPr>
+          <p:nvPr/>
+        </p:nvPicPr>
+        <p:blipFill>
+          <a:blip r:embed="rId3"/>
+          <a:stretch>
+            <a:fillRect/>
+          </a:stretch>
+        </p:blipFill>
+        <p:spPr>
+          <a:xfrm>
+            <a:off x="2331521" y="2041086"/>
+            <a:ext cx="7267699" cy="3870090"/>
+          </a:xfrm>
+          <a:prstGeom prst="rect">
+            <a:avLst/>
+          </a:prstGeom>
+        </p:spPr>
+      </p:pic>
+      <p:sp>
+        <p:nvSpPr>
+          <p:cNvPr id="8" name="TextBox 7">
+            <a:extLst>
+              <a:ext uri="{FF2B5EF4-FFF2-40B4-BE49-F238E27FC236}">
+                <a16:creationId xmlns:a16="http://schemas.microsoft.com/office/drawing/2014/main" id="{823881D8-678A-48FA-A8DF-25670FC1898A}"/>
+              </a:ext>
+            </a:extLst>
+          </p:cNvPr>
+          <p:cNvSpPr txBox="1"/>
+          <p:nvPr/>
+        </p:nvSpPr>
+        <p:spPr>
+          <a:xfrm>
+            <a:off x="9527969" y="2082141"/>
+            <a:ext cx="494805" cy="369332"/>
+          </a:xfrm>
+          <a:prstGeom prst="rect">
+            <a:avLst/>
+          </a:prstGeom>
+          <a:noFill/>
+        </p:spPr>
+        <p:txBody>
+          <a:bodyPr wrap="square" rtlCol="0">
+            <a:spAutoFit/>
+          </a:bodyPr>
+          <a:lstStyle/>
+          <a:p>
+            <a:r>
+              <a:rPr lang="en-US" b="1" dirty="0">
+                <a:solidFill>
+                  <a:srgbClr val="FF0000"/>
+                </a:solidFill>
+              </a:rPr>
+              <a:t>1</a:t>
+            </a:r>
+          </a:p>
+        </p:txBody>
+      </p:sp>
+      <p:sp>
+        <p:nvSpPr>
+          <p:cNvPr id="9" name="TextBox 8">
+            <a:extLst>
+              <a:ext uri="{FF2B5EF4-FFF2-40B4-BE49-F238E27FC236}">
+                <a16:creationId xmlns:a16="http://schemas.microsoft.com/office/drawing/2014/main" id="{29E966DD-3764-4A9A-8CD4-0A0DBF596DB9}"/>
+              </a:ext>
+            </a:extLst>
+          </p:cNvPr>
+          <p:cNvSpPr txBox="1"/>
+          <p:nvPr/>
+        </p:nvSpPr>
+        <p:spPr>
+          <a:xfrm>
+            <a:off x="7507184" y="4605648"/>
+            <a:ext cx="494805" cy="369332"/>
+          </a:xfrm>
+          <a:prstGeom prst="rect">
+            <a:avLst/>
+          </a:prstGeom>
+          <a:noFill/>
+        </p:spPr>
+        <p:txBody>
+          <a:bodyPr wrap="square" rtlCol="0">
+            <a:spAutoFit/>
+          </a:bodyPr>
+          <a:lstStyle/>
+          <a:p>
+            <a:r>
+              <a:rPr lang="en-US" b="1" dirty="0">
+                <a:solidFill>
+                  <a:srgbClr val="FF0000"/>
+                </a:solidFill>
+              </a:rPr>
+              <a:t>2</a:t>
+            </a:r>
+          </a:p>
+        </p:txBody>
+      </p:sp>
+      <p:sp>
+        <p:nvSpPr>
+          <p:cNvPr id="10" name="Rectangle 9">
+            <a:extLst>
+              <a:ext uri="{FF2B5EF4-FFF2-40B4-BE49-F238E27FC236}">
+                <a16:creationId xmlns:a16="http://schemas.microsoft.com/office/drawing/2014/main" id="{4DACDCF8-ED95-4E44-9F33-766692F640EE}"/>
+              </a:ext>
+            </a:extLst>
+          </p:cNvPr>
+          <p:cNvSpPr/>
+          <p:nvPr/>
+        </p:nvSpPr>
+        <p:spPr>
+          <a:xfrm>
+            <a:off x="8902537" y="2101931"/>
+            <a:ext cx="676893" cy="369332"/>
+          </a:xfrm>
+          <a:prstGeom prst="rect">
+            <a:avLst/>
+          </a:prstGeom>
+          <a:noFill/>
+          <a:ln w="38100">
+            <a:solidFill>
+              <a:srgbClr val="FF0000"/>
+            </a:solidFill>
+          </a:ln>
+        </p:spPr>
+        <p:style>
+          <a:lnRef idx="2">
+            <a:schemeClr val="accent1">
+              <a:shade val="50000"/>
+            </a:schemeClr>
+          </a:lnRef>
+          <a:fillRef idx="1">
+            <a:schemeClr val="accent1"/>
+          </a:fillRef>
+          <a:effectRef idx="0">
+            <a:schemeClr val="accent1"/>
+          </a:effectRef>
+          <a:fontRef idx="minor">
+            <a:schemeClr val="lt1"/>
+          </a:fontRef>
+        </p:style>
+        <p:txBody>
+          <a:bodyPr rtlCol="0" anchor="ctr"/>
+          <a:lstStyle/>
+          <a:p>
+            <a:pPr algn="ctr"/>
+            <a:endParaRPr lang="en-US"/>
+          </a:p>
+        </p:txBody>
+      </p:sp>
+      <p:sp>
+        <p:nvSpPr>
+          <p:cNvPr id="11" name="Rectangle 10">
+            <a:extLst>
+              <a:ext uri="{FF2B5EF4-FFF2-40B4-BE49-F238E27FC236}">
+                <a16:creationId xmlns:a16="http://schemas.microsoft.com/office/drawing/2014/main" id="{33F53F2F-FAF6-4B93-9B53-9B887E5C9983}"/>
+              </a:ext>
+            </a:extLst>
+          </p:cNvPr>
+          <p:cNvSpPr/>
+          <p:nvPr/>
+        </p:nvSpPr>
+        <p:spPr>
+          <a:xfrm>
+            <a:off x="6422077" y="4611631"/>
+            <a:ext cx="1031668" cy="369332"/>
+          </a:xfrm>
+          <a:prstGeom prst="rect">
+            <a:avLst/>
+          </a:prstGeom>
+          <a:noFill/>
+          <a:ln w="38100">
+            <a:solidFill>
+              <a:srgbClr val="FF0000"/>
+            </a:solidFill>
+          </a:ln>
+        </p:spPr>
+        <p:style>
+          <a:lnRef idx="2">
+            <a:schemeClr val="accent1">
+              <a:shade val="50000"/>
+            </a:schemeClr>
+          </a:lnRef>
+          <a:fillRef idx="1">
+            <a:schemeClr val="accent1"/>
+          </a:fillRef>
+          <a:effectRef idx="0">
+            <a:schemeClr val="accent1"/>
+          </a:effectRef>
+          <a:fontRef idx="minor">
+            <a:schemeClr val="lt1"/>
+          </a:fontRef>
+        </p:style>
+        <p:txBody>
+          <a:bodyPr rtlCol="0" anchor="ctr"/>
+          <a:lstStyle/>
+          <a:p>
+            <a:pPr algn="ctr"/>
+            <a:endParaRPr lang="en-US"/>
+          </a:p>
+        </p:txBody>
+      </p:sp>
+    </p:spTree>
+    <p:extLst>
+      <p:ext uri="{BB962C8B-B14F-4D97-AF65-F5344CB8AC3E}">
+        <p14:creationId xmlns:p14="http://schemas.microsoft.com/office/powerpoint/2010/main" val="2472283662"/>
+      </p:ext>
+    </p:extLst>
+  </p:cSld>
+  <p:clrMapOvr>
+    <a:masterClrMapping/>
+  </p:clrMapOvr>
+</p:sld>
+</file>
+
 <file path=ppt/theme/theme1.xml><?xml version="1.0" encoding="utf-8"?>
 <a:theme xmlns:a="http://schemas.openxmlformats.org/drawingml/2006/main" name="Office Theme">
   <a:themeElements>

</xml_diff>

<commit_message>
cannot use move pkg to download annotated tel
</commit_message>
<xml_diff>
--- a/slides/remote-sensing-intro.pptx
+++ b/slides/remote-sensing-intro.pptx
@@ -277,7 +277,7 @@
           <a:p>
             <a:fld id="{28399A50-FCE3-4952-AC0D-E5D3B3A2EB2C}" type="datetimeFigureOut">
               <a:rPr lang="en-US" smtClean="0"/>
-              <a:t>2023-08-06</a:t>
+              <a:t>8/6/2023</a:t>
             </a:fld>
             <a:endParaRPr lang="en-US"/>
           </a:p>
@@ -475,7 +475,7 @@
           <a:p>
             <a:fld id="{28399A50-FCE3-4952-AC0D-E5D3B3A2EB2C}" type="datetimeFigureOut">
               <a:rPr lang="en-US" smtClean="0"/>
-              <a:t>2023-08-06</a:t>
+              <a:t>8/6/2023</a:t>
             </a:fld>
             <a:endParaRPr lang="en-US"/>
           </a:p>
@@ -683,7 +683,7 @@
           <a:p>
             <a:fld id="{28399A50-FCE3-4952-AC0D-E5D3B3A2EB2C}" type="datetimeFigureOut">
               <a:rPr lang="en-US" smtClean="0"/>
-              <a:t>2023-08-06</a:t>
+              <a:t>8/6/2023</a:t>
             </a:fld>
             <a:endParaRPr lang="en-US"/>
           </a:p>
@@ -891,7 +891,7 @@
           <a:p>
             <a:fld id="{28399A50-FCE3-4952-AC0D-E5D3B3A2EB2C}" type="datetimeFigureOut">
               <a:rPr lang="en-US" smtClean="0"/>
-              <a:t>2023-08-06</a:t>
+              <a:t>8/6/2023</a:t>
             </a:fld>
             <a:endParaRPr lang="en-US"/>
           </a:p>
@@ -1166,7 +1166,7 @@
           <a:p>
             <a:fld id="{28399A50-FCE3-4952-AC0D-E5D3B3A2EB2C}" type="datetimeFigureOut">
               <a:rPr lang="en-US" smtClean="0"/>
-              <a:t>2023-08-06</a:t>
+              <a:t>8/6/2023</a:t>
             </a:fld>
             <a:endParaRPr lang="en-US"/>
           </a:p>
@@ -1431,7 +1431,7 @@
           <a:p>
             <a:fld id="{28399A50-FCE3-4952-AC0D-E5D3B3A2EB2C}" type="datetimeFigureOut">
               <a:rPr lang="en-US" smtClean="0"/>
-              <a:t>2023-08-06</a:t>
+              <a:t>8/6/2023</a:t>
             </a:fld>
             <a:endParaRPr lang="en-US"/>
           </a:p>
@@ -1843,7 +1843,7 @@
           <a:p>
             <a:fld id="{28399A50-FCE3-4952-AC0D-E5D3B3A2EB2C}" type="datetimeFigureOut">
               <a:rPr lang="en-US" smtClean="0"/>
-              <a:t>2023-08-06</a:t>
+              <a:t>8/6/2023</a:t>
             </a:fld>
             <a:endParaRPr lang="en-US"/>
           </a:p>
@@ -1984,7 +1984,7 @@
           <a:p>
             <a:fld id="{28399A50-FCE3-4952-AC0D-E5D3B3A2EB2C}" type="datetimeFigureOut">
               <a:rPr lang="en-US" smtClean="0"/>
-              <a:t>2023-08-06</a:t>
+              <a:t>8/6/2023</a:t>
             </a:fld>
             <a:endParaRPr lang="en-US"/>
           </a:p>
@@ -2097,7 +2097,7 @@
           <a:p>
             <a:fld id="{28399A50-FCE3-4952-AC0D-E5D3B3A2EB2C}" type="datetimeFigureOut">
               <a:rPr lang="en-US" smtClean="0"/>
-              <a:t>2023-08-06</a:t>
+              <a:t>8/6/2023</a:t>
             </a:fld>
             <a:endParaRPr lang="en-US"/>
           </a:p>
@@ -2408,7 +2408,7 @@
           <a:p>
             <a:fld id="{28399A50-FCE3-4952-AC0D-E5D3B3A2EB2C}" type="datetimeFigureOut">
               <a:rPr lang="en-US" smtClean="0"/>
-              <a:t>2023-08-06</a:t>
+              <a:t>8/6/2023</a:t>
             </a:fld>
             <a:endParaRPr lang="en-US"/>
           </a:p>
@@ -2696,7 +2696,7 @@
           <a:p>
             <a:fld id="{28399A50-FCE3-4952-AC0D-E5D3B3A2EB2C}" type="datetimeFigureOut">
               <a:rPr lang="en-US" smtClean="0"/>
-              <a:t>2023-08-06</a:t>
+              <a:t>8/6/2023</a:t>
             </a:fld>
             <a:endParaRPr lang="en-US"/>
           </a:p>
@@ -2937,7 +2937,7 @@
           <a:p>
             <a:fld id="{28399A50-FCE3-4952-AC0D-E5D3B3A2EB2C}" type="datetimeFigureOut">
               <a:rPr lang="en-US" smtClean="0"/>
-              <a:t>2023-08-06</a:t>
+              <a:t>8/6/2023</a:t>
             </a:fld>
             <a:endParaRPr lang="en-US"/>
           </a:p>
@@ -4223,7 +4223,7 @@
           <p:nvPr>
             <p:extLst>
               <p:ext uri="{D42A27DB-BD31-4B8C-83A1-F6EECF244321}">
-                <p14:modId xmlns:p14="http://schemas.microsoft.com/office/powerpoint/2010/main" val="3013141086"/>
+                <p14:modId xmlns:p14="http://schemas.microsoft.com/office/powerpoint/2010/main" val="1126540746"/>
               </p:ext>
             </p:extLst>
           </p:nvPr>
@@ -4762,10 +4762,7 @@
                     <a:lstStyle/>
                     <a:p>
                       <a:pPr algn="ctr"/>
-                      <a:r>
-                        <a:rPr lang="en-CA" sz="2000" dirty="0"/>
-                        <a:t>move (?)</a:t>
-                      </a:r>
+                      <a:endParaRPr lang="en-CA" sz="2000" dirty="0"/>
                     </a:p>
                   </a:txBody>
                   <a:tcPr marL="103392" marR="103392" marT="51696" marB="51696"/>

</xml_diff>